<commit_message>
Update eGramSabha hackathon submission files and enhance system architecture documentation
</commit_message>
<xml_diff>
--- a/eGramSabha_Hackathon_Submission.pptx
+++ b/eGramSabha_Hackathon_Submission.pptx
@@ -3346,8 +3346,8 @@
         </p:nvSpPr>
         <p:spPr>
           <a:xfrm>
-            <a:off x="365760" y="1325880"/>
-            <a:ext cx="5303520" cy="658368"/>
+            <a:off x="310896" y="1188720"/>
+            <a:ext cx="8412480" cy="621792"/>
           </a:xfrm>
           <a:prstGeom prst="roundRect">
             <a:avLst>
@@ -3394,8 +3394,8 @@
         </p:nvSpPr>
         <p:spPr>
           <a:xfrm>
-            <a:off x="502920" y="1362456"/>
-            <a:ext cx="5029200" cy="228600"/>
+            <a:off x="420624" y="1207008"/>
+            <a:ext cx="2286000" cy="146304"/>
           </a:xfrm>
           <a:prstGeom prst="rect">
             <a:avLst/>
@@ -3408,27 +3408,75 @@
           <a:p>
             <a:pPr algn="l"/>
             <a:r>
-              <a:rPr sz="1000" b="1">
+              <a:rPr sz="900" b="1">
                 <a:solidFill>
                   <a:srgbClr val="1976D2"/>
                 </a:solidFill>
                 <a:latin typeface="Manrope SemiBold"/>
               </a:rPr>
-              <a:t>Frontend  (React + Material-UI)</a:t>
-            </a:r>
-          </a:p>
-        </p:txBody>
-      </p:sp>
-      <p:sp>
-        <p:nvSpPr>
-          <p:cNvPr id="6" name="TextBox 5"/>
+              <a:t>Client Browser</a:t>
+            </a:r>
+          </a:p>
+        </p:txBody>
+      </p:sp>
+      <p:sp>
+        <p:nvSpPr>
+          <p:cNvPr id="6" name="Rounded Rectangle 5"/>
+          <p:cNvSpPr/>
+          <p:nvPr/>
+        </p:nvSpPr>
+        <p:spPr>
+          <a:xfrm>
+            <a:off x="420624" y="1389888"/>
+            <a:ext cx="2606040" cy="365760"/>
+          </a:xfrm>
+          <a:prstGeom prst="roundRect">
+            <a:avLst>
+              <a:gd name="adj" fmla="val 6000"/>
+            </a:avLst>
+          </a:prstGeom>
+          <a:solidFill>
+            <a:srgbClr val="FFFFFF"/>
+          </a:solidFill>
+          <a:ln w="9525">
+            <a:solidFill>
+              <a:srgbClr val="1976D2"/>
+            </a:solidFill>
+          </a:ln>
+        </p:spPr>
+        <p:style>
+          <a:lnRef idx="1">
+            <a:schemeClr val="accent1"/>
+          </a:lnRef>
+          <a:fillRef idx="3">
+            <a:schemeClr val="accent1"/>
+          </a:fillRef>
+          <a:effectRef idx="2">
+            <a:schemeClr val="accent1"/>
+          </a:effectRef>
+          <a:fontRef idx="minor">
+            <a:schemeClr val="lt1"/>
+          </a:fontRef>
+        </p:style>
+        <p:txBody>
+          <a:bodyPr rtlCol="0" anchor="ctr"/>
+          <a:lstStyle/>
+          <a:p>
+            <a:pPr algn="ctr"/>
+            <a:endParaRPr/>
+          </a:p>
+        </p:txBody>
+      </p:sp>
+      <p:sp>
+        <p:nvSpPr>
+          <p:cNvPr id="7" name="TextBox 6"/>
           <p:cNvSpPr txBox="1"/>
           <p:nvPr/>
         </p:nvSpPr>
         <p:spPr>
           <a:xfrm>
-            <a:off x="502920" y="1618488"/>
-            <a:ext cx="5029200" cy="320040"/>
+            <a:off x="475488" y="1408176"/>
+            <a:ext cx="2496312" cy="118872"/>
           </a:xfrm>
           <a:prstGeom prst="rect">
             <a:avLst/>
@@ -3441,27 +3489,291 @@
           <a:p>
             <a:pPr algn="l"/>
             <a:r>
-              <a:rPr sz="800" b="0">
+              <a:rPr sz="700" b="1">
+                <a:solidFill>
+                  <a:srgbClr val="0D47A1"/>
+                </a:solidFill>
+                <a:latin typeface="Manrope SemiBold"/>
+              </a:rPr>
+              <a:t>Admin Portal</a:t>
+            </a:r>
+          </a:p>
+        </p:txBody>
+      </p:sp>
+      <p:sp>
+        <p:nvSpPr>
+          <p:cNvPr id="8" name="TextBox 7"/>
+          <p:cNvSpPr txBox="1"/>
+          <p:nvPr/>
+        </p:nvSpPr>
+        <p:spPr>
+          <a:xfrm>
+            <a:off x="475488" y="1536192"/>
+            <a:ext cx="2496312" cy="201168"/>
+          </a:xfrm>
+          <a:prstGeom prst="rect">
+            <a:avLst/>
+          </a:prstGeom>
+          <a:noFill/>
+        </p:spPr>
+        <p:txBody>
+          <a:bodyPr wrap="square"/>
+          <a:lstStyle/>
+          <a:p>
+            <a:pPr algn="l"/>
+            <a:r>
+              <a:rPr sz="600" b="0">
                 <a:solidFill>
                   <a:srgbClr val="434343"/>
                 </a:solidFill>
                 <a:latin typeface="Manrope"/>
               </a:rPr>
-              <a:t>3 Portals  |  Face Recognition  |  Biometric Engine  |  Bilingual UI  |  Report Generation</a:t>
-            </a:r>
-          </a:p>
-        </p:txBody>
-      </p:sp>
-      <p:sp>
-        <p:nvSpPr>
-          <p:cNvPr id="7" name="Down Arrow 6"/>
+              <a:t>Panchayat Onboarding
+Bulk Import • Statistics</a:t>
+            </a:r>
+          </a:p>
+        </p:txBody>
+      </p:sp>
+      <p:sp>
+        <p:nvSpPr>
+          <p:cNvPr id="9" name="Rounded Rectangle 8"/>
           <p:cNvSpPr/>
           <p:nvPr/>
         </p:nvSpPr>
         <p:spPr>
           <a:xfrm>
-            <a:off x="2834640" y="1993392"/>
-            <a:ext cx="182880" cy="164592"/>
+            <a:off x="3163824" y="1389888"/>
+            <a:ext cx="2606040" cy="365760"/>
+          </a:xfrm>
+          <a:prstGeom prst="roundRect">
+            <a:avLst>
+              <a:gd name="adj" fmla="val 6000"/>
+            </a:avLst>
+          </a:prstGeom>
+          <a:solidFill>
+            <a:srgbClr val="FFFFFF"/>
+          </a:solidFill>
+          <a:ln w="9525">
+            <a:solidFill>
+              <a:srgbClr val="1976D2"/>
+            </a:solidFill>
+          </a:ln>
+        </p:spPr>
+        <p:style>
+          <a:lnRef idx="1">
+            <a:schemeClr val="accent1"/>
+          </a:lnRef>
+          <a:fillRef idx="3">
+            <a:schemeClr val="accent1"/>
+          </a:fillRef>
+          <a:effectRef idx="2">
+            <a:schemeClr val="accent1"/>
+          </a:effectRef>
+          <a:fontRef idx="minor">
+            <a:schemeClr val="lt1"/>
+          </a:fontRef>
+        </p:style>
+        <p:txBody>
+          <a:bodyPr rtlCol="0" anchor="ctr"/>
+          <a:lstStyle/>
+          <a:p>
+            <a:pPr algn="ctr"/>
+            <a:endParaRPr/>
+          </a:p>
+        </p:txBody>
+      </p:sp>
+      <p:sp>
+        <p:nvSpPr>
+          <p:cNvPr id="10" name="TextBox 9"/>
+          <p:cNvSpPr txBox="1"/>
+          <p:nvPr/>
+        </p:nvSpPr>
+        <p:spPr>
+          <a:xfrm>
+            <a:off x="3218688" y="1408176"/>
+            <a:ext cx="2496312" cy="118872"/>
+          </a:xfrm>
+          <a:prstGeom prst="rect">
+            <a:avLst/>
+          </a:prstGeom>
+          <a:noFill/>
+        </p:spPr>
+        <p:txBody>
+          <a:bodyPr wrap="square"/>
+          <a:lstStyle/>
+          <a:p>
+            <a:pPr algn="l"/>
+            <a:r>
+              <a:rPr sz="700" b="1">
+                <a:solidFill>
+                  <a:srgbClr val="0D47A1"/>
+                </a:solidFill>
+                <a:latin typeface="Manrope SemiBold"/>
+              </a:rPr>
+              <a:t>Official Portal</a:t>
+            </a:r>
+          </a:p>
+        </p:txBody>
+      </p:sp>
+      <p:sp>
+        <p:nvSpPr>
+          <p:cNvPr id="11" name="TextBox 10"/>
+          <p:cNvSpPr txBox="1"/>
+          <p:nvPr/>
+        </p:nvSpPr>
+        <p:spPr>
+          <a:xfrm>
+            <a:off x="3218688" y="1536192"/>
+            <a:ext cx="2496312" cy="201168"/>
+          </a:xfrm>
+          <a:prstGeom prst="rect">
+            <a:avLst/>
+          </a:prstGeom>
+          <a:noFill/>
+        </p:spPr>
+        <p:txBody>
+          <a:bodyPr wrap="square"/>
+          <a:lstStyle/>
+          <a:p>
+            <a:pPr algn="l"/>
+            <a:r>
+              <a:rPr sz="600" b="0">
+                <a:solidFill>
+                  <a:srgbClr val="434343"/>
+                </a:solidFill>
+                <a:latin typeface="Manrope"/>
+              </a:rPr>
+              <a:t>Issue Mgmt • Meeting Mgmt
+Attendance • Agenda/MOM</a:t>
+            </a:r>
+          </a:p>
+        </p:txBody>
+      </p:sp>
+      <p:sp>
+        <p:nvSpPr>
+          <p:cNvPr id="12" name="Rounded Rectangle 11"/>
+          <p:cNvSpPr/>
+          <p:nvPr/>
+        </p:nvSpPr>
+        <p:spPr>
+          <a:xfrm>
+            <a:off x="5907024" y="1389888"/>
+            <a:ext cx="2606040" cy="365760"/>
+          </a:xfrm>
+          <a:prstGeom prst="roundRect">
+            <a:avLst>
+              <a:gd name="adj" fmla="val 6000"/>
+            </a:avLst>
+          </a:prstGeom>
+          <a:solidFill>
+            <a:srgbClr val="FFFFFF"/>
+          </a:solidFill>
+          <a:ln w="9525">
+            <a:solidFill>
+              <a:srgbClr val="1976D2"/>
+            </a:solidFill>
+          </a:ln>
+        </p:spPr>
+        <p:style>
+          <a:lnRef idx="1">
+            <a:schemeClr val="accent1"/>
+          </a:lnRef>
+          <a:fillRef idx="3">
+            <a:schemeClr val="accent1"/>
+          </a:fillRef>
+          <a:effectRef idx="2">
+            <a:schemeClr val="accent1"/>
+          </a:effectRef>
+          <a:fontRef idx="minor">
+            <a:schemeClr val="lt1"/>
+          </a:fontRef>
+        </p:style>
+        <p:txBody>
+          <a:bodyPr rtlCol="0" anchor="ctr"/>
+          <a:lstStyle/>
+          <a:p>
+            <a:pPr algn="ctr"/>
+            <a:endParaRPr/>
+          </a:p>
+        </p:txBody>
+      </p:sp>
+      <p:sp>
+        <p:nvSpPr>
+          <p:cNvPr id="13" name="TextBox 12"/>
+          <p:cNvSpPr txBox="1"/>
+          <p:nvPr/>
+        </p:nvSpPr>
+        <p:spPr>
+          <a:xfrm>
+            <a:off x="5961888" y="1408176"/>
+            <a:ext cx="2496312" cy="118872"/>
+          </a:xfrm>
+          <a:prstGeom prst="rect">
+            <a:avLst/>
+          </a:prstGeom>
+          <a:noFill/>
+        </p:spPr>
+        <p:txBody>
+          <a:bodyPr wrap="square"/>
+          <a:lstStyle/>
+          <a:p>
+            <a:pPr algn="l"/>
+            <a:r>
+              <a:rPr sz="700" b="1">
+                <a:solidFill>
+                  <a:srgbClr val="0D47A1"/>
+                </a:solidFill>
+                <a:latin typeface="Manrope SemiBold"/>
+              </a:rPr>
+              <a:t>Citizen Portal</a:t>
+            </a:r>
+          </a:p>
+        </p:txBody>
+      </p:sp>
+      <p:sp>
+        <p:nvSpPr>
+          <p:cNvPr id="14" name="TextBox 13"/>
+          <p:cNvSpPr txBox="1"/>
+          <p:nvPr/>
+        </p:nvSpPr>
+        <p:spPr>
+          <a:xfrm>
+            <a:off x="5961888" y="1536192"/>
+            <a:ext cx="2496312" cy="201168"/>
+          </a:xfrm>
+          <a:prstGeom prst="rect">
+            <a:avLst/>
+          </a:prstGeom>
+          <a:noFill/>
+        </p:spPr>
+        <p:txBody>
+          <a:bodyPr wrap="square"/>
+          <a:lstStyle/>
+          <a:p>
+            <a:pPr algn="l"/>
+            <a:r>
+              <a:rPr sz="600" b="0">
+                <a:solidFill>
+                  <a:srgbClr val="434343"/>
+                </a:solidFill>
+                <a:latin typeface="Manrope"/>
+              </a:rPr>
+              <a:t>Face Login • Issue Report
+RSVP • Tracking</a:t>
+            </a:r>
+          </a:p>
+        </p:txBody>
+      </p:sp>
+      <p:sp>
+        <p:nvSpPr>
+          <p:cNvPr id="15" name="Down Arrow 14"/>
+          <p:cNvSpPr/>
+          <p:nvPr/>
+        </p:nvSpPr>
+        <p:spPr>
+          <a:xfrm>
+            <a:off x="4425696" y="1819656"/>
+            <a:ext cx="182880" cy="146304"/>
           </a:xfrm>
           <a:prstGeom prst="downArrow">
             <a:avLst/>
@@ -3498,14 +3810,47 @@
       </p:sp>
       <p:sp>
         <p:nvSpPr>
-          <p:cNvPr id="8" name="Rounded Rectangle 7"/>
+          <p:cNvPr id="16" name="TextBox 15"/>
+          <p:cNvSpPr txBox="1"/>
+          <p:nvPr/>
+        </p:nvSpPr>
+        <p:spPr>
+          <a:xfrm>
+            <a:off x="4681728" y="1819656"/>
+            <a:ext cx="1645920" cy="128016"/>
+          </a:xfrm>
+          <a:prstGeom prst="rect">
+            <a:avLst/>
+          </a:prstGeom>
+          <a:noFill/>
+        </p:spPr>
+        <p:txBody>
+          <a:bodyPr wrap="square"/>
+          <a:lstStyle/>
+          <a:p>
+            <a:pPr algn="l"/>
+            <a:r>
+              <a:rPr sz="600" b="1">
+                <a:solidFill>
+                  <a:srgbClr val="1976D2"/>
+                </a:solidFill>
+                <a:latin typeface="Manrope SemiBold"/>
+              </a:rPr>
+              <a:t>HTTPS / REST + JWT</a:t>
+            </a:r>
+          </a:p>
+        </p:txBody>
+      </p:sp>
+      <p:sp>
+        <p:nvSpPr>
+          <p:cNvPr id="17" name="Rounded Rectangle 16"/>
           <p:cNvSpPr/>
           <p:nvPr/>
         </p:nvSpPr>
         <p:spPr>
           <a:xfrm>
-            <a:off x="365760" y="2194560"/>
-            <a:ext cx="5303520" cy="658368"/>
+            <a:off x="310896" y="1993392"/>
+            <a:ext cx="8412480" cy="548640"/>
           </a:xfrm>
           <a:prstGeom prst="roundRect">
             <a:avLst>
@@ -3546,14 +3891,14 @@
       </p:sp>
       <p:sp>
         <p:nvSpPr>
-          <p:cNvPr id="9" name="TextBox 8"/>
+          <p:cNvPr id="18" name="TextBox 17"/>
           <p:cNvSpPr txBox="1"/>
           <p:nvPr/>
         </p:nvSpPr>
         <p:spPr>
           <a:xfrm>
-            <a:off x="502920" y="2231136"/>
-            <a:ext cx="5029200" cy="228600"/>
+            <a:off x="420624" y="2011680"/>
+            <a:ext cx="4572000" cy="146304"/>
           </a:xfrm>
           <a:prstGeom prst="rect">
             <a:avLst/>
@@ -3566,27 +3911,71 @@
           <a:p>
             <a:pPr algn="l"/>
             <a:r>
-              <a:rPr sz="1000" b="1">
+              <a:rPr sz="900" b="1">
                 <a:solidFill>
                   <a:srgbClr val="2E7D32"/>
                 </a:solidFill>
                 <a:latin typeface="Manrope SemiBold"/>
               </a:rPr>
-              <a:t>Backend API  (Node.js + Express)</a:t>
-            </a:r>
-          </a:p>
-        </p:txBody>
-      </p:sp>
-      <p:sp>
-        <p:nvSpPr>
-          <p:cNvPr id="10" name="TextBox 9"/>
+              <a:t>Backend API Service  (Node.js + Express)</a:t>
+            </a:r>
+          </a:p>
+        </p:txBody>
+      </p:sp>
+      <p:sp>
+        <p:nvSpPr>
+          <p:cNvPr id="19" name="Rectangle 18"/>
+          <p:cNvSpPr/>
+          <p:nvPr/>
+        </p:nvSpPr>
+        <p:spPr>
+          <a:xfrm>
+            <a:off x="420624" y="2185416"/>
+            <a:ext cx="8193024" cy="128016"/>
+          </a:xfrm>
+          <a:prstGeom prst="rect">
+            <a:avLst/>
+          </a:prstGeom>
+          <a:solidFill>
+            <a:srgbClr val="C8E6C9"/>
+          </a:solidFill>
+          <a:ln>
+            <a:noFill/>
+          </a:ln>
+        </p:spPr>
+        <p:style>
+          <a:lnRef idx="1">
+            <a:schemeClr val="accent1"/>
+          </a:lnRef>
+          <a:fillRef idx="3">
+            <a:schemeClr val="accent1"/>
+          </a:fillRef>
+          <a:effectRef idx="2">
+            <a:schemeClr val="accent1"/>
+          </a:effectRef>
+          <a:fontRef idx="minor">
+            <a:schemeClr val="lt1"/>
+          </a:fontRef>
+        </p:style>
+        <p:txBody>
+          <a:bodyPr rtlCol="0" anchor="ctr"/>
+          <a:lstStyle/>
+          <a:p>
+            <a:pPr algn="ctr"/>
+            <a:endParaRPr/>
+          </a:p>
+        </p:txBody>
+      </p:sp>
+      <p:sp>
+        <p:nvSpPr>
+          <p:cNvPr id="20" name="TextBox 19"/>
           <p:cNvSpPr txBox="1"/>
           <p:nvPr/>
         </p:nvSpPr>
         <p:spPr>
           <a:xfrm>
-            <a:off x="502920" y="2487168"/>
-            <a:ext cx="5029200" cy="320040"/>
+            <a:off x="493776" y="2194560"/>
+            <a:ext cx="8046720" cy="109728"/>
           </a:xfrm>
           <a:prstGeom prst="rect">
             <a:avLst/>
@@ -3597,29 +3986,353 @@
           <a:bodyPr wrap="square"/>
           <a:lstStyle/>
           <a:p>
-            <a:pPr algn="l"/>
-            <a:r>
-              <a:rPr sz="800" b="0">
-                <a:solidFill>
-                  <a:srgbClr val="434343"/>
-                </a:solidFill>
-                <a:latin typeface="Manrope"/>
-              </a:rPr>
-              <a:t>REST APIs  |  Data Models  |  JWT Auth  |  RBAC  |  File Storage  |  Scheduled Jobs</a:t>
-            </a:r>
-          </a:p>
-        </p:txBody>
-      </p:sp>
-      <p:sp>
-        <p:nvSpPr>
-          <p:cNvPr id="11" name="Down Arrow 10"/>
+            <a:pPr algn="ctr"/>
+            <a:r>
+              <a:rPr sz="600" b="1">
+                <a:solidFill>
+                  <a:srgbClr val="2E7D32"/>
+                </a:solidFill>
+                <a:latin typeface="Manrope SemiBold"/>
+              </a:rPr>
+              <a:t>Middleware:  Security → Rate Limit → Auth → Authorization → Data Scope</a:t>
+            </a:r>
+          </a:p>
+        </p:txBody>
+      </p:sp>
+      <p:sp>
+        <p:nvSpPr>
+          <p:cNvPr id="21" name="Rounded Rectangle 20"/>
           <p:cNvSpPr/>
           <p:nvPr/>
         </p:nvSpPr>
         <p:spPr>
           <a:xfrm>
-            <a:off x="2834640" y="2862072"/>
-            <a:ext cx="182880" cy="164592"/>
+            <a:off x="420624" y="2340864"/>
+            <a:ext cx="1920240" cy="146304"/>
+          </a:xfrm>
+          <a:prstGeom prst="roundRect">
+            <a:avLst>
+              <a:gd name="adj" fmla="val 6000"/>
+            </a:avLst>
+          </a:prstGeom>
+          <a:solidFill>
+            <a:srgbClr val="FFFFFF"/>
+          </a:solidFill>
+          <a:ln w="6350">
+            <a:solidFill>
+              <a:srgbClr val="2E7D32"/>
+            </a:solidFill>
+          </a:ln>
+        </p:spPr>
+        <p:style>
+          <a:lnRef idx="1">
+            <a:schemeClr val="accent1"/>
+          </a:lnRef>
+          <a:fillRef idx="3">
+            <a:schemeClr val="accent1"/>
+          </a:fillRef>
+          <a:effectRef idx="2">
+            <a:schemeClr val="accent1"/>
+          </a:effectRef>
+          <a:fontRef idx="minor">
+            <a:schemeClr val="lt1"/>
+          </a:fontRef>
+        </p:style>
+        <p:txBody>
+          <a:bodyPr rtlCol="0" anchor="ctr"/>
+          <a:lstStyle/>
+          <a:p>
+            <a:pPr algn="ctr"/>
+            <a:endParaRPr/>
+          </a:p>
+        </p:txBody>
+      </p:sp>
+      <p:sp>
+        <p:nvSpPr>
+          <p:cNvPr id="22" name="TextBox 21"/>
+          <p:cNvSpPr txBox="1"/>
+          <p:nvPr/>
+        </p:nvSpPr>
+        <p:spPr>
+          <a:xfrm>
+            <a:off x="420624" y="2350008"/>
+            <a:ext cx="1920240" cy="128016"/>
+          </a:xfrm>
+          <a:prstGeom prst="rect">
+            <a:avLst/>
+          </a:prstGeom>
+          <a:noFill/>
+        </p:spPr>
+        <p:txBody>
+          <a:bodyPr wrap="square"/>
+          <a:lstStyle/>
+          <a:p>
+            <a:pPr algn="ctr"/>
+            <a:r>
+              <a:rPr sz="600" b="1">
+                <a:solidFill>
+                  <a:srgbClr val="2E7D32"/>
+                </a:solidFill>
+                <a:latin typeface="Manrope SemiBold"/>
+              </a:rPr>
+              <a:t>Route Files</a:t>
+            </a:r>
+          </a:p>
+        </p:txBody>
+      </p:sp>
+      <p:sp>
+        <p:nvSpPr>
+          <p:cNvPr id="23" name="Rounded Rectangle 22"/>
+          <p:cNvSpPr/>
+          <p:nvPr/>
+        </p:nvSpPr>
+        <p:spPr>
+          <a:xfrm>
+            <a:off x="2450592" y="2340864"/>
+            <a:ext cx="1920240" cy="146304"/>
+          </a:xfrm>
+          <a:prstGeom prst="roundRect">
+            <a:avLst>
+              <a:gd name="adj" fmla="val 6000"/>
+            </a:avLst>
+          </a:prstGeom>
+          <a:solidFill>
+            <a:srgbClr val="FFFFFF"/>
+          </a:solidFill>
+          <a:ln w="6350">
+            <a:solidFill>
+              <a:srgbClr val="2E7D32"/>
+            </a:solidFill>
+          </a:ln>
+        </p:spPr>
+        <p:style>
+          <a:lnRef idx="1">
+            <a:schemeClr val="accent1"/>
+          </a:lnRef>
+          <a:fillRef idx="3">
+            <a:schemeClr val="accent1"/>
+          </a:fillRef>
+          <a:effectRef idx="2">
+            <a:schemeClr val="accent1"/>
+          </a:effectRef>
+          <a:fontRef idx="minor">
+            <a:schemeClr val="lt1"/>
+          </a:fontRef>
+        </p:style>
+        <p:txBody>
+          <a:bodyPr rtlCol="0" anchor="ctr"/>
+          <a:lstStyle/>
+          <a:p>
+            <a:pPr algn="ctr"/>
+            <a:endParaRPr/>
+          </a:p>
+        </p:txBody>
+      </p:sp>
+      <p:sp>
+        <p:nvSpPr>
+          <p:cNvPr id="24" name="TextBox 23"/>
+          <p:cNvSpPr txBox="1"/>
+          <p:nvPr/>
+        </p:nvSpPr>
+        <p:spPr>
+          <a:xfrm>
+            <a:off x="2450592" y="2350008"/>
+            <a:ext cx="1920240" cy="128016"/>
+          </a:xfrm>
+          <a:prstGeom prst="rect">
+            <a:avLst/>
+          </a:prstGeom>
+          <a:noFill/>
+        </p:spPr>
+        <p:txBody>
+          <a:bodyPr wrap="square"/>
+          <a:lstStyle/>
+          <a:p>
+            <a:pPr algn="ctr"/>
+            <a:r>
+              <a:rPr sz="600" b="1">
+                <a:solidFill>
+                  <a:srgbClr val="2E7D32"/>
+                </a:solidFill>
+                <a:latin typeface="Manrope SemiBold"/>
+              </a:rPr>
+              <a:t>Business Logic</a:t>
+            </a:r>
+          </a:p>
+        </p:txBody>
+      </p:sp>
+      <p:sp>
+        <p:nvSpPr>
+          <p:cNvPr id="25" name="Rounded Rectangle 24"/>
+          <p:cNvSpPr/>
+          <p:nvPr/>
+        </p:nvSpPr>
+        <p:spPr>
+          <a:xfrm>
+            <a:off x="4480560" y="2340864"/>
+            <a:ext cx="1920240" cy="146304"/>
+          </a:xfrm>
+          <a:prstGeom prst="roundRect">
+            <a:avLst>
+              <a:gd name="adj" fmla="val 6000"/>
+            </a:avLst>
+          </a:prstGeom>
+          <a:solidFill>
+            <a:srgbClr val="FFFFFF"/>
+          </a:solidFill>
+          <a:ln w="6350">
+            <a:solidFill>
+              <a:srgbClr val="2E7D32"/>
+            </a:solidFill>
+          </a:ln>
+        </p:spPr>
+        <p:style>
+          <a:lnRef idx="1">
+            <a:schemeClr val="accent1"/>
+          </a:lnRef>
+          <a:fillRef idx="3">
+            <a:schemeClr val="accent1"/>
+          </a:fillRef>
+          <a:effectRef idx="2">
+            <a:schemeClr val="accent1"/>
+          </a:effectRef>
+          <a:fontRef idx="minor">
+            <a:schemeClr val="lt1"/>
+          </a:fontRef>
+        </p:style>
+        <p:txBody>
+          <a:bodyPr rtlCol="0" anchor="ctr"/>
+          <a:lstStyle/>
+          <a:p>
+            <a:pPr algn="ctr"/>
+            <a:endParaRPr/>
+          </a:p>
+        </p:txBody>
+      </p:sp>
+      <p:sp>
+        <p:nvSpPr>
+          <p:cNvPr id="26" name="TextBox 25"/>
+          <p:cNvSpPr txBox="1"/>
+          <p:nvPr/>
+        </p:nvSpPr>
+        <p:spPr>
+          <a:xfrm>
+            <a:off x="4480560" y="2350008"/>
+            <a:ext cx="1920240" cy="128016"/>
+          </a:xfrm>
+          <a:prstGeom prst="rect">
+            <a:avLst/>
+          </a:prstGeom>
+          <a:noFill/>
+        </p:spPr>
+        <p:txBody>
+          <a:bodyPr wrap="square"/>
+          <a:lstStyle/>
+          <a:p>
+            <a:pPr algn="ctr"/>
+            <a:r>
+              <a:rPr sz="600" b="1">
+                <a:solidFill>
+                  <a:srgbClr val="2E7D32"/>
+                </a:solidFill>
+                <a:latin typeface="Manrope SemiBold"/>
+              </a:rPr>
+              <a:t>GridFS Storage</a:t>
+            </a:r>
+          </a:p>
+        </p:txBody>
+      </p:sp>
+      <p:sp>
+        <p:nvSpPr>
+          <p:cNvPr id="27" name="Rounded Rectangle 26"/>
+          <p:cNvSpPr/>
+          <p:nvPr/>
+        </p:nvSpPr>
+        <p:spPr>
+          <a:xfrm>
+            <a:off x="6510528" y="2340864"/>
+            <a:ext cx="1920240" cy="146304"/>
+          </a:xfrm>
+          <a:prstGeom prst="roundRect">
+            <a:avLst>
+              <a:gd name="adj" fmla="val 6000"/>
+            </a:avLst>
+          </a:prstGeom>
+          <a:solidFill>
+            <a:srgbClr val="FFFFFF"/>
+          </a:solidFill>
+          <a:ln w="6350">
+            <a:solidFill>
+              <a:srgbClr val="2E7D32"/>
+            </a:solidFill>
+          </a:ln>
+        </p:spPr>
+        <p:style>
+          <a:lnRef idx="1">
+            <a:schemeClr val="accent1"/>
+          </a:lnRef>
+          <a:fillRef idx="3">
+            <a:schemeClr val="accent1"/>
+          </a:fillRef>
+          <a:effectRef idx="2">
+            <a:schemeClr val="accent1"/>
+          </a:effectRef>
+          <a:fontRef idx="minor">
+            <a:schemeClr val="lt1"/>
+          </a:fontRef>
+        </p:style>
+        <p:txBody>
+          <a:bodyPr rtlCol="0" anchor="ctr"/>
+          <a:lstStyle/>
+          <a:p>
+            <a:pPr algn="ctr"/>
+            <a:endParaRPr/>
+          </a:p>
+        </p:txBody>
+      </p:sp>
+      <p:sp>
+        <p:nvSpPr>
+          <p:cNvPr id="28" name="TextBox 27"/>
+          <p:cNvSpPr txBox="1"/>
+          <p:nvPr/>
+        </p:nvSpPr>
+        <p:spPr>
+          <a:xfrm>
+            <a:off x="6510528" y="2350008"/>
+            <a:ext cx="1920240" cy="128016"/>
+          </a:xfrm>
+          <a:prstGeom prst="rect">
+            <a:avLst/>
+          </a:prstGeom>
+          <a:noFill/>
+        </p:spPr>
+        <p:txBody>
+          <a:bodyPr wrap="square"/>
+          <a:lstStyle/>
+          <a:p>
+            <a:pPr algn="ctr"/>
+            <a:r>
+              <a:rPr sz="600" b="1">
+                <a:solidFill>
+                  <a:srgbClr val="2E7D32"/>
+                </a:solidFill>
+                <a:latin typeface="Manrope SemiBold"/>
+              </a:rPr>
+              <a:t>Cron Jobs</a:t>
+            </a:r>
+          </a:p>
+        </p:txBody>
+      </p:sp>
+      <p:sp>
+        <p:nvSpPr>
+          <p:cNvPr id="29" name="Down Arrow 28"/>
+          <p:cNvSpPr/>
+          <p:nvPr/>
+        </p:nvSpPr>
+        <p:spPr>
+          <a:xfrm>
+            <a:off x="2212848" y="2551176"/>
+            <a:ext cx="182880" cy="146304"/>
           </a:xfrm>
           <a:prstGeom prst="downArrow">
             <a:avLst/>
@@ -3656,14 +4369,124 @@
       </p:sp>
       <p:sp>
         <p:nvSpPr>
-          <p:cNvPr id="12" name="Rounded Rectangle 11"/>
+          <p:cNvPr id="30" name="TextBox 29"/>
+          <p:cNvSpPr txBox="1"/>
+          <p:nvPr/>
+        </p:nvSpPr>
+        <p:spPr>
+          <a:xfrm>
+            <a:off x="2459736" y="2551176"/>
+            <a:ext cx="1463040" cy="128016"/>
+          </a:xfrm>
+          <a:prstGeom prst="rect">
+            <a:avLst/>
+          </a:prstGeom>
+          <a:noFill/>
+        </p:spPr>
+        <p:txBody>
+          <a:bodyPr wrap="square"/>
+          <a:lstStyle/>
+          <a:p>
+            <a:pPr algn="l"/>
+            <a:r>
+              <a:rPr sz="600" b="1">
+                <a:solidFill>
+                  <a:srgbClr val="2E7D32"/>
+                </a:solidFill>
+                <a:latin typeface="Manrope SemiBold"/>
+              </a:rPr>
+              <a:t>REST / Async Polling</a:t>
+            </a:r>
+          </a:p>
+        </p:txBody>
+      </p:sp>
+      <p:sp>
+        <p:nvSpPr>
+          <p:cNvPr id="31" name="Down Arrow 30"/>
           <p:cNvSpPr/>
           <p:nvPr/>
         </p:nvSpPr>
         <p:spPr>
           <a:xfrm>
-            <a:off x="365760" y="3063240"/>
-            <a:ext cx="5303520" cy="658368"/>
+            <a:off x="6574536" y="2551176"/>
+            <a:ext cx="182880" cy="146304"/>
+          </a:xfrm>
+          <a:prstGeom prst="downArrow">
+            <a:avLst/>
+          </a:prstGeom>
+          <a:solidFill>
+            <a:srgbClr val="2E7D32"/>
+          </a:solidFill>
+          <a:ln>
+            <a:noFill/>
+          </a:ln>
+        </p:spPr>
+        <p:style>
+          <a:lnRef idx="1">
+            <a:schemeClr val="accent1"/>
+          </a:lnRef>
+          <a:fillRef idx="3">
+            <a:schemeClr val="accent1"/>
+          </a:fillRef>
+          <a:effectRef idx="2">
+            <a:schemeClr val="accent1"/>
+          </a:effectRef>
+          <a:fontRef idx="minor">
+            <a:schemeClr val="lt1"/>
+          </a:fontRef>
+        </p:style>
+        <p:txBody>
+          <a:bodyPr rtlCol="0" anchor="ctr"/>
+          <a:lstStyle/>
+          <a:p>
+            <a:pPr algn="ctr"/>
+            <a:endParaRPr/>
+          </a:p>
+        </p:txBody>
+      </p:sp>
+      <p:sp>
+        <p:nvSpPr>
+          <p:cNvPr id="32" name="TextBox 31"/>
+          <p:cNvSpPr txBox="1"/>
+          <p:nvPr/>
+        </p:nvSpPr>
+        <p:spPr>
+          <a:xfrm>
+            <a:off x="6821424" y="2551176"/>
+            <a:ext cx="1280160" cy="128016"/>
+          </a:xfrm>
+          <a:prstGeom prst="rect">
+            <a:avLst/>
+          </a:prstGeom>
+          <a:noFill/>
+        </p:spPr>
+        <p:txBody>
+          <a:bodyPr wrap="square"/>
+          <a:lstStyle/>
+          <a:p>
+            <a:pPr algn="l"/>
+            <a:r>
+              <a:rPr sz="600" b="1">
+                <a:solidFill>
+                  <a:srgbClr val="2E7D32"/>
+                </a:solidFill>
+                <a:latin typeface="Manrope SemiBold"/>
+              </a:rPr>
+              <a:t>Mongoose ODM</a:t>
+            </a:r>
+          </a:p>
+        </p:txBody>
+      </p:sp>
+      <p:sp>
+        <p:nvSpPr>
+          <p:cNvPr id="33" name="Rounded Rectangle 32"/>
+          <p:cNvSpPr/>
+          <p:nvPr/>
+        </p:nvSpPr>
+        <p:spPr>
+          <a:xfrm>
+            <a:off x="310896" y="2743200"/>
+            <a:ext cx="3977639" cy="713232"/>
           </a:xfrm>
           <a:prstGeom prst="roundRect">
             <a:avLst>
@@ -3704,14 +4527,14 @@
       </p:sp>
       <p:sp>
         <p:nvSpPr>
-          <p:cNvPr id="13" name="TextBox 12"/>
+          <p:cNvPr id="34" name="TextBox 33"/>
           <p:cNvSpPr txBox="1"/>
           <p:nvPr/>
         </p:nvSpPr>
         <p:spPr>
           <a:xfrm>
-            <a:off x="502920" y="3099816"/>
-            <a:ext cx="5029200" cy="228600"/>
+            <a:off x="402336" y="2761488"/>
+            <a:ext cx="3200400" cy="146304"/>
           </a:xfrm>
           <a:prstGeom prst="rect">
             <a:avLst/>
@@ -3724,7 +4547,7 @@
           <a:p>
             <a:pPr algn="l"/>
             <a:r>
-              <a:rPr sz="1000" b="1">
+              <a:rPr sz="900" b="1">
                 <a:solidFill>
                   <a:srgbClr val="E65C00"/>
                 </a:solidFill>
@@ -3737,80 +4560,14 @@
       </p:sp>
       <p:sp>
         <p:nvSpPr>
-          <p:cNvPr id="14" name="TextBox 13"/>
-          <p:cNvSpPr txBox="1"/>
-          <p:nvPr/>
-        </p:nvSpPr>
-        <p:spPr>
-          <a:xfrm>
-            <a:off x="502920" y="3355848"/>
-            <a:ext cx="5029200" cy="320040"/>
-          </a:xfrm>
-          <a:prstGeom prst="rect">
-            <a:avLst/>
-          </a:prstGeom>
-          <a:noFill/>
-        </p:spPr>
-        <p:txBody>
-          <a:bodyPr wrap="square"/>
-          <a:lstStyle/>
-          <a:p>
-            <a:pPr algn="l"/>
-            <a:r>
-              <a:rPr sz="800" b="0">
-                <a:solidFill>
-                  <a:srgbClr val="434343"/>
-                </a:solidFill>
-                <a:latin typeface="Manrope"/>
-              </a:rPr>
-              <a:t>Async STT + LLM + Translation  |  Strategy Pattern Providers  |  MongoDB Tracking</a:t>
-            </a:r>
-          </a:p>
-        </p:txBody>
-      </p:sp>
-      <p:sp>
-        <p:nvSpPr>
-          <p:cNvPr id="15" name="TextBox 14"/>
-          <p:cNvSpPr txBox="1"/>
-          <p:nvPr/>
-        </p:nvSpPr>
-        <p:spPr>
-          <a:xfrm>
-            <a:off x="5989320" y="1234440"/>
-            <a:ext cx="2834640" cy="182880"/>
-          </a:xfrm>
-          <a:prstGeom prst="rect">
-            <a:avLst/>
-          </a:prstGeom>
-          <a:noFill/>
-        </p:spPr>
-        <p:txBody>
-          <a:bodyPr wrap="square"/>
-          <a:lstStyle/>
-          <a:p>
-            <a:pPr algn="l"/>
-            <a:r>
-              <a:rPr sz="800" b="1">
-                <a:solidFill>
-                  <a:srgbClr val="0D47A1"/>
-                </a:solidFill>
-                <a:latin typeface="Manrope SemiBold"/>
-              </a:rPr>
-              <a:t>AI PROVIDERS (CONFIGURABLE)</a:t>
-            </a:r>
-          </a:p>
-        </p:txBody>
-      </p:sp>
-      <p:sp>
-        <p:nvSpPr>
-          <p:cNvPr id="16" name="Rounded Rectangle 15"/>
+          <p:cNvPr id="35" name="Rounded Rectangle 34"/>
           <p:cNvSpPr/>
           <p:nvPr/>
         </p:nvSpPr>
         <p:spPr>
           <a:xfrm>
-            <a:off x="5989320" y="1463040"/>
-            <a:ext cx="2834640" cy="411480"/>
+            <a:off x="402336" y="2944368"/>
+            <a:ext cx="2286000" cy="438912"/>
           </a:xfrm>
           <a:prstGeom prst="roundRect">
             <a:avLst>
@@ -3820,9 +4577,9 @@
           <a:solidFill>
             <a:srgbClr val="FFFFFF"/>
           </a:solidFill>
-          <a:ln w="12700">
+          <a:ln w="6350">
             <a:solidFill>
-              <a:srgbClr val="1976D2"/>
+              <a:srgbClr val="E65C00"/>
             </a:solidFill>
           </a:ln>
         </p:spPr>
@@ -3851,23 +4608,94 @@
       </p:sp>
       <p:sp>
         <p:nvSpPr>
-          <p:cNvPr id="17" name="Rectangle 16"/>
+          <p:cNvPr id="36" name="TextBox 35"/>
+          <p:cNvSpPr txBox="1"/>
+          <p:nvPr/>
+        </p:nvSpPr>
+        <p:spPr>
+          <a:xfrm>
+            <a:off x="457200" y="2953512"/>
+            <a:ext cx="2176272" cy="118872"/>
+          </a:xfrm>
+          <a:prstGeom prst="rect">
+            <a:avLst/>
+          </a:prstGeom>
+          <a:noFill/>
+        </p:spPr>
+        <p:txBody>
+          <a:bodyPr wrap="square"/>
+          <a:lstStyle/>
+          <a:p>
+            <a:pPr algn="l"/>
+            <a:r>
+              <a:rPr sz="700" b="1">
+                <a:solidFill>
+                  <a:srgbClr val="E65C00"/>
+                </a:solidFill>
+                <a:latin typeface="Manrope SemiBold"/>
+              </a:rPr>
+              <a:t>Provider Abstraction</a:t>
+            </a:r>
+          </a:p>
+        </p:txBody>
+      </p:sp>
+      <p:sp>
+        <p:nvSpPr>
+          <p:cNvPr id="37" name="TextBox 36"/>
+          <p:cNvSpPr txBox="1"/>
+          <p:nvPr/>
+        </p:nvSpPr>
+        <p:spPr>
+          <a:xfrm>
+            <a:off x="457200" y="3090672"/>
+            <a:ext cx="2176272" cy="274320"/>
+          </a:xfrm>
+          <a:prstGeom prst="rect">
+            <a:avLst/>
+          </a:prstGeom>
+          <a:noFill/>
+        </p:spPr>
+        <p:txBody>
+          <a:bodyPr wrap="square"/>
+          <a:lstStyle/>
+          <a:p>
+            <a:pPr algn="l"/>
+            <a:r>
+              <a:rPr sz="600" b="0">
+                <a:solidFill>
+                  <a:srgbClr val="434343"/>
+                </a:solidFill>
+                <a:latin typeface="Manrope"/>
+              </a:rPr>
+              <a:t>• STT Pipeline    • LLM Pipeline
+• Translation    • Async Processing</a:t>
+            </a:r>
+          </a:p>
+        </p:txBody>
+      </p:sp>
+      <p:sp>
+        <p:nvSpPr>
+          <p:cNvPr id="38" name="Rounded Rectangle 37"/>
           <p:cNvSpPr/>
           <p:nvPr/>
         </p:nvSpPr>
         <p:spPr>
           <a:xfrm>
-            <a:off x="5989320" y="1463040"/>
-            <a:ext cx="54864" cy="411480"/>
-          </a:xfrm>
-          <a:prstGeom prst="rect">
-            <a:avLst/>
+            <a:off x="2779776" y="2944368"/>
+            <a:ext cx="1417320" cy="438912"/>
+          </a:xfrm>
+          <a:prstGeom prst="roundRect">
+            <a:avLst>
+              <a:gd name="adj" fmla="val 6000"/>
+            </a:avLst>
           </a:prstGeom>
           <a:solidFill>
-            <a:srgbClr val="1976D2"/>
+            <a:srgbClr val="FFFFFF"/>
           </a:solidFill>
-          <a:ln>
-            <a:noFill/>
+          <a:ln w="6350">
+            <a:solidFill>
+              <a:srgbClr val="E65C00"/>
+            </a:solidFill>
           </a:ln>
         </p:spPr>
         <p:style>
@@ -3895,14 +4723,14 @@
       </p:sp>
       <p:sp>
         <p:nvSpPr>
-          <p:cNvPr id="18" name="TextBox 17"/>
+          <p:cNvPr id="39" name="TextBox 38"/>
           <p:cNvSpPr txBox="1"/>
           <p:nvPr/>
         </p:nvSpPr>
         <p:spPr>
           <a:xfrm>
-            <a:off x="6126480" y="1472184"/>
-            <a:ext cx="640080" cy="182880"/>
+            <a:off x="2834640" y="2953512"/>
+            <a:ext cx="1307592" cy="118872"/>
           </a:xfrm>
           <a:prstGeom prst="rect">
             <a:avLst/>
@@ -3915,27 +4743,27 @@
           <a:p>
             <a:pPr algn="l"/>
             <a:r>
-              <a:rPr sz="800" b="1">
-                <a:solidFill>
-                  <a:srgbClr val="1976D2"/>
+              <a:rPr sz="700" b="1">
+                <a:solidFill>
+                  <a:srgbClr val="E65C00"/>
                 </a:solidFill>
                 <a:latin typeface="Manrope SemiBold"/>
               </a:rPr>
-              <a:t>STT</a:t>
-            </a:r>
-          </a:p>
-        </p:txBody>
-      </p:sp>
-      <p:sp>
-        <p:nvSpPr>
-          <p:cNvPr id="19" name="TextBox 18"/>
+              <a:t>Request Tracker</a:t>
+            </a:r>
+          </a:p>
+        </p:txBody>
+      </p:sp>
+      <p:sp>
+        <p:nvSpPr>
+          <p:cNvPr id="40" name="TextBox 39"/>
           <p:cNvSpPr txBox="1"/>
           <p:nvPr/>
         </p:nvSpPr>
         <p:spPr>
           <a:xfrm>
-            <a:off x="6126480" y="1664208"/>
-            <a:ext cx="2560320" cy="182880"/>
+            <a:off x="2834640" y="3090672"/>
+            <a:ext cx="1307592" cy="274320"/>
           </a:xfrm>
           <a:prstGeom prst="rect">
             <a:avLst/>
@@ -3948,27 +4776,28 @@
           <a:p>
             <a:pPr algn="l"/>
             <a:r>
-              <a:rPr sz="800" b="0">
-                <a:solidFill>
-                  <a:srgbClr val="666666"/>
+              <a:rPr sz="600" b="0">
+                <a:solidFill>
+                  <a:srgbClr val="434343"/>
                 </a:solidFill>
                 <a:latin typeface="Manrope"/>
               </a:rPr>
-              <a:t>Multiple speech-to-text providers (configurable)</a:t>
-            </a:r>
-          </a:p>
-        </p:txBody>
-      </p:sp>
-      <p:sp>
-        <p:nvSpPr>
-          <p:cNvPr id="20" name="Rounded Rectangle 19"/>
+              <a:t>• Status Management
+• Progress Updates</a:t>
+            </a:r>
+          </a:p>
+        </p:txBody>
+      </p:sp>
+      <p:sp>
+        <p:nvSpPr>
+          <p:cNvPr id="41" name="Rounded Rectangle 40"/>
           <p:cNvSpPr/>
           <p:nvPr/>
         </p:nvSpPr>
         <p:spPr>
           <a:xfrm>
-            <a:off x="5989320" y="1938528"/>
-            <a:ext cx="2834640" cy="411480"/>
+            <a:off x="4608576" y="2743200"/>
+            <a:ext cx="4114800" cy="713232"/>
           </a:xfrm>
           <a:prstGeom prst="roundRect">
             <a:avLst>
@@ -3976,11 +4805,11 @@
             </a:avLst>
           </a:prstGeom>
           <a:solidFill>
-            <a:srgbClr val="FFFFFF"/>
+            <a:srgbClr val="F5F5F5"/>
           </a:solidFill>
-          <a:ln w="12700">
+          <a:ln w="19050">
             <a:solidFill>
-              <a:srgbClr val="2E7D32"/>
+              <a:srgbClr val="0D47A1"/>
             </a:solidFill>
           </a:ln>
         </p:spPr>
@@ -4009,23 +4838,60 @@
       </p:sp>
       <p:sp>
         <p:nvSpPr>
-          <p:cNvPr id="21" name="Rectangle 20"/>
+          <p:cNvPr id="42" name="TextBox 41"/>
+          <p:cNvSpPr txBox="1"/>
+          <p:nvPr/>
+        </p:nvSpPr>
+        <p:spPr>
+          <a:xfrm>
+            <a:off x="4700016" y="2761488"/>
+            <a:ext cx="2743200" cy="146304"/>
+          </a:xfrm>
+          <a:prstGeom prst="rect">
+            <a:avLst/>
+          </a:prstGeom>
+          <a:noFill/>
+        </p:spPr>
+        <p:txBody>
+          <a:bodyPr wrap="square"/>
+          <a:lstStyle/>
+          <a:p>
+            <a:pPr algn="l"/>
+            <a:r>
+              <a:rPr sz="900" b="1">
+                <a:solidFill>
+                  <a:srgbClr val="0D47A1"/>
+                </a:solidFill>
+                <a:latin typeface="Manrope SemiBold"/>
+              </a:rPr>
+              <a:t>MongoDB Database</a:t>
+            </a:r>
+          </a:p>
+        </p:txBody>
+      </p:sp>
+      <p:sp>
+        <p:nvSpPr>
+          <p:cNvPr id="43" name="Rounded Rectangle 42"/>
           <p:cNvSpPr/>
           <p:nvPr/>
         </p:nvSpPr>
         <p:spPr>
           <a:xfrm>
-            <a:off x="5989320" y="1938528"/>
-            <a:ext cx="54864" cy="411480"/>
-          </a:xfrm>
-          <a:prstGeom prst="rect">
-            <a:avLst/>
+            <a:off x="4700016" y="2944368"/>
+            <a:ext cx="2606040" cy="438912"/>
+          </a:xfrm>
+          <a:prstGeom prst="roundRect">
+            <a:avLst>
+              <a:gd name="adj" fmla="val 6000"/>
+            </a:avLst>
           </a:prstGeom>
           <a:solidFill>
-            <a:srgbClr val="2E7D32"/>
+            <a:srgbClr val="FFFFFF"/>
           </a:solidFill>
-          <a:ln>
-            <a:noFill/>
+          <a:ln w="6350">
+            <a:solidFill>
+              <a:srgbClr val="0D47A1"/>
+            </a:solidFill>
           </a:ln>
         </p:spPr>
         <p:style>
@@ -4053,14 +4919,14 @@
       </p:sp>
       <p:sp>
         <p:nvSpPr>
-          <p:cNvPr id="22" name="TextBox 21"/>
+          <p:cNvPr id="44" name="TextBox 43"/>
           <p:cNvSpPr txBox="1"/>
           <p:nvPr/>
         </p:nvSpPr>
         <p:spPr>
           <a:xfrm>
-            <a:off x="6126480" y="1947672"/>
-            <a:ext cx="640080" cy="182880"/>
+            <a:off x="4754880" y="2953512"/>
+            <a:ext cx="2496312" cy="118872"/>
           </a:xfrm>
           <a:prstGeom prst="rect">
             <a:avLst/>
@@ -4073,27 +4939,27 @@
           <a:p>
             <a:pPr algn="l"/>
             <a:r>
-              <a:rPr sz="800" b="1">
-                <a:solidFill>
-                  <a:srgbClr val="2E7D32"/>
+              <a:rPr sz="700" b="1">
+                <a:solidFill>
+                  <a:srgbClr val="0D47A1"/>
                 </a:solidFill>
                 <a:latin typeface="Manrope SemiBold"/>
               </a:rPr>
-              <a:t>LLM</a:t>
-            </a:r>
-          </a:p>
-        </p:txBody>
-      </p:sp>
-      <p:sp>
-        <p:nvSpPr>
-          <p:cNvPr id="23" name="TextBox 22"/>
+              <a:t>Collections</a:t>
+            </a:r>
+          </a:p>
+        </p:txBody>
+      </p:sp>
+      <p:sp>
+        <p:nvSpPr>
+          <p:cNvPr id="45" name="TextBox 44"/>
           <p:cNvSpPr txBox="1"/>
           <p:nvPr/>
         </p:nvSpPr>
         <p:spPr>
           <a:xfrm>
-            <a:off x="6126480" y="2139696"/>
-            <a:ext cx="2560320" cy="182880"/>
+            <a:off x="4754880" y="3090672"/>
+            <a:ext cx="2496312" cy="274320"/>
           </a:xfrm>
           <a:prstGeom prst="rect">
             <a:avLst/>
@@ -4106,27 +4972,28 @@
           <a:p>
             <a:pPr algn="l"/>
             <a:r>
-              <a:rPr sz="800" b="0">
-                <a:solidFill>
-                  <a:srgbClr val="666666"/>
+              <a:rPr sz="600" b="0">
+                <a:solidFill>
+                  <a:srgbClr val="434343"/>
                 </a:solidFill>
                 <a:latin typeface="Manrope"/>
               </a:rPr>
-              <a:t>Multiple LLM providers (configurable)</a:t>
-            </a:r>
-          </a:p>
-        </p:txBody>
-      </p:sp>
-      <p:sp>
-        <p:nvSpPr>
-          <p:cNvPr id="24" name="Rounded Rectangle 23"/>
+              <a:t>users • officials • panchayats • issues
+gramsabhas • rsvps • roles • config</a:t>
+            </a:r>
+          </a:p>
+        </p:txBody>
+      </p:sp>
+      <p:sp>
+        <p:nvSpPr>
+          <p:cNvPr id="46" name="Rounded Rectangle 45"/>
           <p:cNvSpPr/>
           <p:nvPr/>
         </p:nvSpPr>
         <p:spPr>
           <a:xfrm>
-            <a:off x="5989320" y="2414016"/>
-            <a:ext cx="2834640" cy="411480"/>
+            <a:off x="7397496" y="2944368"/>
+            <a:ext cx="1234440" cy="438912"/>
           </a:xfrm>
           <a:prstGeom prst="roundRect">
             <a:avLst>
@@ -4136,9 +5003,9 @@
           <a:solidFill>
             <a:srgbClr val="FFFFFF"/>
           </a:solidFill>
-          <a:ln w="12700">
+          <a:ln w="6350">
             <a:solidFill>
-              <a:srgbClr val="E65C00"/>
+              <a:srgbClr val="0D47A1"/>
             </a:solidFill>
           </a:ln>
         </p:spPr>
@@ -4167,16 +5034,83 @@
       </p:sp>
       <p:sp>
         <p:nvSpPr>
-          <p:cNvPr id="25" name="Rectangle 24"/>
+          <p:cNvPr id="47" name="TextBox 46"/>
+          <p:cNvSpPr txBox="1"/>
+          <p:nvPr/>
+        </p:nvSpPr>
+        <p:spPr>
+          <a:xfrm>
+            <a:off x="7452360" y="2953512"/>
+            <a:ext cx="1124712" cy="118872"/>
+          </a:xfrm>
+          <a:prstGeom prst="rect">
+            <a:avLst/>
+          </a:prstGeom>
+          <a:noFill/>
+        </p:spPr>
+        <p:txBody>
+          <a:bodyPr wrap="square"/>
+          <a:lstStyle/>
+          <a:p>
+            <a:pPr algn="l"/>
+            <a:r>
+              <a:rPr sz="700" b="1">
+                <a:solidFill>
+                  <a:srgbClr val="0D47A1"/>
+                </a:solidFill>
+                <a:latin typeface="Manrope SemiBold"/>
+              </a:rPr>
+              <a:t>GridFS</a:t>
+            </a:r>
+          </a:p>
+        </p:txBody>
+      </p:sp>
+      <p:sp>
+        <p:nvSpPr>
+          <p:cNvPr id="48" name="TextBox 47"/>
+          <p:cNvSpPr txBox="1"/>
+          <p:nvPr/>
+        </p:nvSpPr>
+        <p:spPr>
+          <a:xfrm>
+            <a:off x="7452360" y="3090672"/>
+            <a:ext cx="1124712" cy="274320"/>
+          </a:xfrm>
+          <a:prstGeom prst="rect">
+            <a:avLst/>
+          </a:prstGeom>
+          <a:noFill/>
+        </p:spPr>
+        <p:txBody>
+          <a:bodyPr wrap="square"/>
+          <a:lstStyle/>
+          <a:p>
+            <a:pPr algn="l"/>
+            <a:r>
+              <a:rPr sz="600" b="0">
+                <a:solidFill>
+                  <a:srgbClr val="434343"/>
+                </a:solidFill>
+                <a:latin typeface="Manrope"/>
+              </a:rPr>
+              <a:t>fs.files
+fs.chunks</a:t>
+            </a:r>
+          </a:p>
+        </p:txBody>
+      </p:sp>
+      <p:sp>
+        <p:nvSpPr>
+          <p:cNvPr id="49" name="Down Arrow 48"/>
           <p:cNvSpPr/>
           <p:nvPr/>
         </p:nvSpPr>
         <p:spPr>
           <a:xfrm>
-            <a:off x="5989320" y="2414016"/>
-            <a:ext cx="54864" cy="411480"/>
-          </a:xfrm>
-          <a:prstGeom prst="rect">
+            <a:off x="2212848" y="3465576"/>
+            <a:ext cx="182880" cy="146304"/>
+          </a:xfrm>
+          <a:prstGeom prst="downArrow">
             <a:avLst/>
           </a:prstGeom>
           <a:solidFill>
@@ -4211,14 +5145,14 @@
       </p:sp>
       <p:sp>
         <p:nvSpPr>
-          <p:cNvPr id="26" name="TextBox 25"/>
+          <p:cNvPr id="50" name="TextBox 49"/>
           <p:cNvSpPr txBox="1"/>
           <p:nvPr/>
         </p:nvSpPr>
         <p:spPr>
           <a:xfrm>
-            <a:off x="6126480" y="2423160"/>
-            <a:ext cx="640080" cy="182880"/>
+            <a:off x="2459736" y="3465576"/>
+            <a:ext cx="1828800" cy="128016"/>
           </a:xfrm>
           <a:prstGeom prst="rect">
             <a:avLst/>
@@ -4231,93 +5165,27 @@
           <a:p>
             <a:pPr algn="l"/>
             <a:r>
-              <a:rPr sz="800" b="1">
+              <a:rPr sz="600" b="1">
                 <a:solidFill>
                   <a:srgbClr val="E65C00"/>
                 </a:solidFill>
                 <a:latin typeface="Manrope SemiBold"/>
               </a:rPr>
-              <a:t>Translate</a:t>
-            </a:r>
-          </a:p>
-        </p:txBody>
-      </p:sp>
-      <p:sp>
-        <p:nvSpPr>
-          <p:cNvPr id="27" name="TextBox 26"/>
-          <p:cNvSpPr txBox="1"/>
-          <p:nvPr/>
-        </p:nvSpPr>
-        <p:spPr>
-          <a:xfrm>
-            <a:off x="6126480" y="2615184"/>
-            <a:ext cx="2560320" cy="182880"/>
-          </a:xfrm>
-          <a:prstGeom prst="rect">
-            <a:avLst/>
-          </a:prstGeom>
-          <a:noFill/>
-        </p:spPr>
-        <p:txBody>
-          <a:bodyPr wrap="square"/>
-          <a:lstStyle/>
-          <a:p>
-            <a:pPr algn="l"/>
-            <a:r>
-              <a:rPr sz="800" b="0">
-                <a:solidFill>
-                  <a:srgbClr val="666666"/>
-                </a:solidFill>
-                <a:latin typeface="Manrope"/>
-              </a:rPr>
-              <a:t>Multiple translation providers (configurable)</a:t>
-            </a:r>
-          </a:p>
-        </p:txBody>
-      </p:sp>
-      <p:sp>
-        <p:nvSpPr>
-          <p:cNvPr id="28" name="TextBox 27"/>
-          <p:cNvSpPr txBox="1"/>
-          <p:nvPr/>
-        </p:nvSpPr>
-        <p:spPr>
-          <a:xfrm>
-            <a:off x="5989320" y="2971800"/>
-            <a:ext cx="2834640" cy="182880"/>
-          </a:xfrm>
-          <a:prstGeom prst="rect">
-            <a:avLst/>
-          </a:prstGeom>
-          <a:noFill/>
-        </p:spPr>
-        <p:txBody>
-          <a:bodyPr wrap="square"/>
-          <a:lstStyle/>
-          <a:p>
-            <a:pPr algn="l"/>
-            <a:r>
-              <a:rPr sz="800" b="1">
-                <a:solidFill>
-                  <a:srgbClr val="0D47A1"/>
-                </a:solidFill>
-                <a:latin typeface="Manrope SemiBold"/>
-              </a:rPr>
-              <a:t>DATABASE</a:t>
-            </a:r>
-          </a:p>
-        </p:txBody>
-      </p:sp>
-      <p:sp>
-        <p:nvSpPr>
-          <p:cNvPr id="29" name="Rounded Rectangle 28"/>
+              <a:t>HTTP/HTTPS + API Keys</a:t>
+            </a:r>
+          </a:p>
+        </p:txBody>
+      </p:sp>
+      <p:sp>
+        <p:nvSpPr>
+          <p:cNvPr id="51" name="Rounded Rectangle 50"/>
           <p:cNvSpPr/>
           <p:nvPr/>
         </p:nvSpPr>
         <p:spPr>
           <a:xfrm>
-            <a:off x="5989320" y="3200400"/>
-            <a:ext cx="2834640" cy="548640"/>
+            <a:off x="310896" y="3657600"/>
+            <a:ext cx="3977639" cy="554182"/>
           </a:xfrm>
           <a:prstGeom prst="roundRect">
             <a:avLst>
@@ -4325,9 +5193,9 @@
             </a:avLst>
           </a:prstGeom>
           <a:solidFill>
-            <a:srgbClr val="F5F5F5"/>
+            <a:srgbClr val="FFFFFF"/>
           </a:solidFill>
-          <a:ln w="12700">
+          <a:ln w="19050">
             <a:solidFill>
               <a:srgbClr val="0D47A1"/>
             </a:solidFill>
@@ -4358,14 +5226,14 @@
       </p:sp>
       <p:sp>
         <p:nvSpPr>
-          <p:cNvPr id="30" name="TextBox 29"/>
+          <p:cNvPr id="52" name="TextBox 51"/>
           <p:cNvSpPr txBox="1"/>
           <p:nvPr/>
         </p:nvSpPr>
         <p:spPr>
           <a:xfrm>
-            <a:off x="6080760" y="3218688"/>
-            <a:ext cx="2651760" cy="502920"/>
+            <a:off x="402336" y="3675888"/>
+            <a:ext cx="2286000" cy="128016"/>
           </a:xfrm>
           <a:prstGeom prst="rect">
             <a:avLst/>
@@ -4378,37 +5246,40 @@
           <a:p>
             <a:pPr algn="l"/>
             <a:r>
-              <a:rPr sz="800" b="0">
-                <a:solidFill>
-                  <a:srgbClr val="434343"/>
-                </a:solidFill>
-                <a:latin typeface="Manrope"/>
-              </a:rPr>
-              <a:t>MongoDB • Multiple Collections • File Storage
-Async AI state tracking database</a:t>
-            </a:r>
-          </a:p>
-        </p:txBody>
-      </p:sp>
-      <p:sp>
-        <p:nvSpPr>
-          <p:cNvPr id="31" name="Rectangle 30"/>
+              <a:rPr sz="800" b="1">
+                <a:solidFill>
+                  <a:srgbClr val="0D47A1"/>
+                </a:solidFill>
+                <a:latin typeface="Manrope SemiBold"/>
+              </a:rPr>
+              <a:t>External AI Services</a:t>
+            </a:r>
+          </a:p>
+        </p:txBody>
+      </p:sp>
+      <p:sp>
+        <p:nvSpPr>
+          <p:cNvPr id="53" name="Rounded Rectangle 52"/>
           <p:cNvSpPr/>
           <p:nvPr/>
         </p:nvSpPr>
         <p:spPr>
           <a:xfrm>
-            <a:off x="310896" y="3977639"/>
-            <a:ext cx="8412480" cy="27432"/>
-          </a:xfrm>
-          <a:prstGeom prst="rect">
-            <a:avLst/>
+            <a:off x="402336" y="3840480"/>
+            <a:ext cx="1188720" cy="302028"/>
+          </a:xfrm>
+          <a:prstGeom prst="roundRect">
+            <a:avLst>
+              <a:gd name="adj" fmla="val 6000"/>
+            </a:avLst>
           </a:prstGeom>
           <a:solidFill>
-            <a:srgbClr val="1976D2"/>
+            <a:srgbClr val="E3F2FD"/>
           </a:solidFill>
-          <a:ln>
-            <a:noFill/>
+          <a:ln w="6350">
+            <a:solidFill>
+              <a:srgbClr val="0D47A1"/>
+            </a:solidFill>
           </a:ln>
         </p:spPr>
         <p:style>
@@ -4436,14 +5307,14 @@
       </p:sp>
       <p:sp>
         <p:nvSpPr>
-          <p:cNvPr id="32" name="TextBox 31"/>
+          <p:cNvPr id="54" name="TextBox 53"/>
           <p:cNvSpPr txBox="1"/>
           <p:nvPr/>
         </p:nvSpPr>
         <p:spPr>
           <a:xfrm>
-            <a:off x="310896" y="4069080"/>
-            <a:ext cx="8412480" cy="457200"/>
+            <a:off x="438912" y="3849624"/>
+            <a:ext cx="1115568" cy="109728"/>
           </a:xfrm>
           <a:prstGeom prst="rect">
             <a:avLst/>
@@ -4454,15 +5325,436 @@
           <a:bodyPr wrap="square"/>
           <a:lstStyle/>
           <a:p>
+            <a:pPr algn="ctr"/>
+            <a:r>
+              <a:rPr sz="600" b="1">
+                <a:solidFill>
+                  <a:srgbClr val="0D47A1"/>
+                </a:solidFill>
+                <a:latin typeface="Manrope SemiBold"/>
+              </a:rPr>
+              <a:t>Speech-to-Text</a:t>
+            </a:r>
+          </a:p>
+        </p:txBody>
+      </p:sp>
+      <p:sp>
+        <p:nvSpPr>
+          <p:cNvPr id="55" name="TextBox 54"/>
+          <p:cNvSpPr txBox="1"/>
+          <p:nvPr/>
+        </p:nvSpPr>
+        <p:spPr>
+          <a:xfrm>
+            <a:off x="438912" y="3959352"/>
+            <a:ext cx="1115568" cy="100584"/>
+          </a:xfrm>
+          <a:prstGeom prst="rect">
+            <a:avLst/>
+          </a:prstGeom>
+          <a:noFill/>
+        </p:spPr>
+        <p:txBody>
+          <a:bodyPr wrap="square"/>
+          <a:lstStyle/>
+          <a:p>
+            <a:pPr algn="ctr"/>
+            <a:r>
+              <a:rPr sz="500" b="0">
+                <a:solidFill>
+                  <a:srgbClr val="434343"/>
+                </a:solidFill>
+                <a:latin typeface="Manrope"/>
+              </a:rPr>
+              <a:t>(Multiple Providers)</a:t>
+            </a:r>
+          </a:p>
+        </p:txBody>
+      </p:sp>
+      <p:sp>
+        <p:nvSpPr>
+          <p:cNvPr id="56" name="Rounded Rectangle 55"/>
+          <p:cNvSpPr/>
+          <p:nvPr/>
+        </p:nvSpPr>
+        <p:spPr>
+          <a:xfrm>
+            <a:off x="1664208" y="3840480"/>
+            <a:ext cx="1188720" cy="302028"/>
+          </a:xfrm>
+          <a:prstGeom prst="roundRect">
+            <a:avLst>
+              <a:gd name="adj" fmla="val 6000"/>
+            </a:avLst>
+          </a:prstGeom>
+          <a:solidFill>
+            <a:srgbClr val="E3F2FD"/>
+          </a:solidFill>
+          <a:ln w="6350">
+            <a:solidFill>
+              <a:srgbClr val="0D47A1"/>
+            </a:solidFill>
+          </a:ln>
+        </p:spPr>
+        <p:style>
+          <a:lnRef idx="1">
+            <a:schemeClr val="accent1"/>
+          </a:lnRef>
+          <a:fillRef idx="3">
+            <a:schemeClr val="accent1"/>
+          </a:fillRef>
+          <a:effectRef idx="2">
+            <a:schemeClr val="accent1"/>
+          </a:effectRef>
+          <a:fontRef idx="minor">
+            <a:schemeClr val="lt1"/>
+          </a:fontRef>
+        </p:style>
+        <p:txBody>
+          <a:bodyPr rtlCol="0" anchor="ctr"/>
+          <a:lstStyle/>
+          <a:p>
+            <a:pPr algn="ctr"/>
+            <a:endParaRPr/>
+          </a:p>
+        </p:txBody>
+      </p:sp>
+      <p:sp>
+        <p:nvSpPr>
+          <p:cNvPr id="57" name="TextBox 56"/>
+          <p:cNvSpPr txBox="1"/>
+          <p:nvPr/>
+        </p:nvSpPr>
+        <p:spPr>
+          <a:xfrm>
+            <a:off x="1700784" y="3849624"/>
+            <a:ext cx="1115568" cy="109728"/>
+          </a:xfrm>
+          <a:prstGeom prst="rect">
+            <a:avLst/>
+          </a:prstGeom>
+          <a:noFill/>
+        </p:spPr>
+        <p:txBody>
+          <a:bodyPr wrap="square"/>
+          <a:lstStyle/>
+          <a:p>
+            <a:pPr algn="ctr"/>
+            <a:r>
+              <a:rPr sz="600" b="1">
+                <a:solidFill>
+                  <a:srgbClr val="0D47A1"/>
+                </a:solidFill>
+                <a:latin typeface="Manrope SemiBold"/>
+              </a:rPr>
+              <a:t>Language Model</a:t>
+            </a:r>
+          </a:p>
+        </p:txBody>
+      </p:sp>
+      <p:sp>
+        <p:nvSpPr>
+          <p:cNvPr id="58" name="TextBox 57"/>
+          <p:cNvSpPr txBox="1"/>
+          <p:nvPr/>
+        </p:nvSpPr>
+        <p:spPr>
+          <a:xfrm>
+            <a:off x="1700784" y="3959352"/>
+            <a:ext cx="1115568" cy="100584"/>
+          </a:xfrm>
+          <a:prstGeom prst="rect">
+            <a:avLst/>
+          </a:prstGeom>
+          <a:noFill/>
+        </p:spPr>
+        <p:txBody>
+          <a:bodyPr wrap="square"/>
+          <a:lstStyle/>
+          <a:p>
+            <a:pPr algn="ctr"/>
+            <a:r>
+              <a:rPr sz="500" b="0">
+                <a:solidFill>
+                  <a:srgbClr val="434343"/>
+                </a:solidFill>
+                <a:latin typeface="Manrope"/>
+              </a:rPr>
+              <a:t>(Multiple Providers)</a:t>
+            </a:r>
+          </a:p>
+        </p:txBody>
+      </p:sp>
+      <p:sp>
+        <p:nvSpPr>
+          <p:cNvPr id="59" name="Rounded Rectangle 58"/>
+          <p:cNvSpPr/>
+          <p:nvPr/>
+        </p:nvSpPr>
+        <p:spPr>
+          <a:xfrm>
+            <a:off x="2926080" y="3840479"/>
+            <a:ext cx="1188720" cy="302029"/>
+          </a:xfrm>
+          <a:prstGeom prst="roundRect">
+            <a:avLst>
+              <a:gd name="adj" fmla="val 6000"/>
+            </a:avLst>
+          </a:prstGeom>
+          <a:solidFill>
+            <a:srgbClr val="E3F2FD"/>
+          </a:solidFill>
+          <a:ln w="6350">
+            <a:solidFill>
+              <a:srgbClr val="0D47A1"/>
+            </a:solidFill>
+          </a:ln>
+        </p:spPr>
+        <p:style>
+          <a:lnRef idx="1">
+            <a:schemeClr val="accent1"/>
+          </a:lnRef>
+          <a:fillRef idx="3">
+            <a:schemeClr val="accent1"/>
+          </a:fillRef>
+          <a:effectRef idx="2">
+            <a:schemeClr val="accent1"/>
+          </a:effectRef>
+          <a:fontRef idx="minor">
+            <a:schemeClr val="lt1"/>
+          </a:fontRef>
+        </p:style>
+        <p:txBody>
+          <a:bodyPr rtlCol="0" anchor="ctr"/>
+          <a:lstStyle/>
+          <a:p>
+            <a:pPr algn="ctr"/>
+            <a:endParaRPr/>
+          </a:p>
+        </p:txBody>
+      </p:sp>
+      <p:sp>
+        <p:nvSpPr>
+          <p:cNvPr id="60" name="TextBox 59"/>
+          <p:cNvSpPr txBox="1"/>
+          <p:nvPr/>
+        </p:nvSpPr>
+        <p:spPr>
+          <a:xfrm>
+            <a:off x="2962656" y="3849624"/>
+            <a:ext cx="1115568" cy="109728"/>
+          </a:xfrm>
+          <a:prstGeom prst="rect">
+            <a:avLst/>
+          </a:prstGeom>
+          <a:noFill/>
+        </p:spPr>
+        <p:txBody>
+          <a:bodyPr wrap="square"/>
+          <a:lstStyle/>
+          <a:p>
+            <a:pPr algn="ctr"/>
+            <a:r>
+              <a:rPr sz="600" b="1">
+                <a:solidFill>
+                  <a:srgbClr val="0D47A1"/>
+                </a:solidFill>
+                <a:latin typeface="Manrope SemiBold"/>
+              </a:rPr>
+              <a:t>Translation</a:t>
+            </a:r>
+          </a:p>
+        </p:txBody>
+      </p:sp>
+      <p:sp>
+        <p:nvSpPr>
+          <p:cNvPr id="61" name="TextBox 60"/>
+          <p:cNvSpPr txBox="1"/>
+          <p:nvPr/>
+        </p:nvSpPr>
+        <p:spPr>
+          <a:xfrm>
+            <a:off x="2962656" y="3959352"/>
+            <a:ext cx="1115568" cy="100584"/>
+          </a:xfrm>
+          <a:prstGeom prst="rect">
+            <a:avLst/>
+          </a:prstGeom>
+          <a:noFill/>
+        </p:spPr>
+        <p:txBody>
+          <a:bodyPr wrap="square"/>
+          <a:lstStyle/>
+          <a:p>
+            <a:pPr algn="ctr"/>
+            <a:r>
+              <a:rPr sz="500" b="0" dirty="0">
+                <a:solidFill>
+                  <a:srgbClr val="434343"/>
+                </a:solidFill>
+                <a:latin typeface="Manrope"/>
+              </a:rPr>
+              <a:t>(Multiple Providers)</a:t>
+            </a:r>
+          </a:p>
+        </p:txBody>
+      </p:sp>
+      <p:sp>
+        <p:nvSpPr>
+          <p:cNvPr id="62" name="Rounded Rectangle 61"/>
+          <p:cNvSpPr/>
+          <p:nvPr/>
+        </p:nvSpPr>
+        <p:spPr>
+          <a:xfrm>
+            <a:off x="4608576" y="3657600"/>
+            <a:ext cx="4114800" cy="554182"/>
+          </a:xfrm>
+          <a:prstGeom prst="roundRect">
+            <a:avLst>
+              <a:gd name="adj" fmla="val 6000"/>
+            </a:avLst>
+          </a:prstGeom>
+          <a:solidFill>
+            <a:srgbClr val="F5F5F5"/>
+          </a:solidFill>
+          <a:ln w="15240">
+            <a:solidFill>
+              <a:srgbClr val="0D47A1"/>
+            </a:solidFill>
+          </a:ln>
+        </p:spPr>
+        <p:style>
+          <a:lnRef idx="1">
+            <a:schemeClr val="accent1"/>
+          </a:lnRef>
+          <a:fillRef idx="3">
+            <a:schemeClr val="accent1"/>
+          </a:fillRef>
+          <a:effectRef idx="2">
+            <a:schemeClr val="accent1"/>
+          </a:effectRef>
+          <a:fontRef idx="minor">
+            <a:schemeClr val="lt1"/>
+          </a:fontRef>
+        </p:style>
+        <p:txBody>
+          <a:bodyPr rtlCol="0" anchor="ctr"/>
+          <a:lstStyle/>
+          <a:p>
+            <a:pPr algn="ctr"/>
+            <a:endParaRPr/>
+          </a:p>
+        </p:txBody>
+      </p:sp>
+      <p:sp>
+        <p:nvSpPr>
+          <p:cNvPr id="63" name="Rectangle 62"/>
+          <p:cNvSpPr/>
+          <p:nvPr/>
+        </p:nvSpPr>
+        <p:spPr>
+          <a:xfrm>
+            <a:off x="4608576" y="3657600"/>
+            <a:ext cx="45720" cy="554182"/>
+          </a:xfrm>
+          <a:prstGeom prst="rect">
+            <a:avLst/>
+          </a:prstGeom>
+          <a:solidFill>
+            <a:srgbClr val="0D47A1"/>
+          </a:solidFill>
+          <a:ln>
+            <a:noFill/>
+          </a:ln>
+        </p:spPr>
+        <p:style>
+          <a:lnRef idx="1">
+            <a:schemeClr val="accent1"/>
+          </a:lnRef>
+          <a:fillRef idx="3">
+            <a:schemeClr val="accent1"/>
+          </a:fillRef>
+          <a:effectRef idx="2">
+            <a:schemeClr val="accent1"/>
+          </a:effectRef>
+          <a:fontRef idx="minor">
+            <a:schemeClr val="lt1"/>
+          </a:fontRef>
+        </p:style>
+        <p:txBody>
+          <a:bodyPr rtlCol="0" anchor="ctr"/>
+          <a:lstStyle/>
+          <a:p>
+            <a:pPr algn="ctr"/>
+            <a:endParaRPr/>
+          </a:p>
+        </p:txBody>
+      </p:sp>
+      <p:sp>
+        <p:nvSpPr>
+          <p:cNvPr id="64" name="TextBox 63"/>
+          <p:cNvSpPr txBox="1"/>
+          <p:nvPr/>
+        </p:nvSpPr>
+        <p:spPr>
+          <a:xfrm>
+            <a:off x="4718304" y="3685032"/>
+            <a:ext cx="1371600" cy="128016"/>
+          </a:xfrm>
+          <a:prstGeom prst="rect">
+            <a:avLst/>
+          </a:prstGeom>
+          <a:noFill/>
+        </p:spPr>
+        <p:txBody>
+          <a:bodyPr wrap="square"/>
+          <a:lstStyle/>
+          <a:p>
             <a:pPr algn="l"/>
             <a:r>
-              <a:rPr sz="900" b="0">
-                <a:solidFill>
-                  <a:srgbClr val="666666"/>
+              <a:rPr sz="800" b="1">
+                <a:solidFill>
+                  <a:srgbClr val="0D47A1"/>
+                </a:solidFill>
+                <a:latin typeface="Manrope SemiBold"/>
+              </a:rPr>
+              <a:t>Deployment</a:t>
+            </a:r>
+          </a:p>
+        </p:txBody>
+      </p:sp>
+      <p:sp>
+        <p:nvSpPr>
+          <p:cNvPr id="65" name="TextBox 64"/>
+          <p:cNvSpPr txBox="1"/>
+          <p:nvPr/>
+        </p:nvSpPr>
+        <p:spPr>
+          <a:xfrm>
+            <a:off x="4718304" y="3831336"/>
+            <a:ext cx="3895344" cy="256032"/>
+          </a:xfrm>
+          <a:prstGeom prst="rect">
+            <a:avLst/>
+          </a:prstGeom>
+          <a:noFill/>
+        </p:spPr>
+        <p:txBody>
+          <a:bodyPr wrap="square"/>
+          <a:lstStyle/>
+          <a:p>
+            <a:pPr algn="l"/>
+            <a:r>
+              <a:rPr sz="600" b="0">
+                <a:solidFill>
+                  <a:srgbClr val="434343"/>
                 </a:solidFill>
                 <a:latin typeface="Manrope"/>
               </a:rPr>
-              <a:t>Deployment: Docker Compose (containerized microservices)  •  Health checks + restart policies  •  Reverse proxy  •  Cloud-agnostic -- runs on any cloud or Kubernetes cluster</a:t>
+              <a:t>• Docker Compose (containerized)
+• Health checks + restart policies
+• Reverse proxy • Cloud-agnostic</a:t>
             </a:r>
           </a:p>
         </p:txBody>
@@ -7203,39 +8495,6 @@
           <a:p>
             <a:pPr algn="ctr"/>
             <a:endParaRPr/>
-          </a:p>
-        </p:txBody>
-      </p:sp>
-      <p:sp>
-        <p:nvSpPr>
-          <p:cNvPr id="17" name="TextBox 16"/>
-          <p:cNvSpPr txBox="1"/>
-          <p:nvPr/>
-        </p:nvSpPr>
-        <p:spPr>
-          <a:xfrm>
-            <a:off x="310896" y="3977639"/>
-            <a:ext cx="8412480" cy="457200"/>
-          </a:xfrm>
-          <a:prstGeom prst="rect">
-            <a:avLst/>
-          </a:prstGeom>
-          <a:noFill/>
-        </p:spPr>
-        <p:txBody>
-          <a:bodyPr wrap="square"/>
-          <a:lstStyle/>
-          <a:p>
-            <a:pPr algn="l"/>
-            <a:r>
-              <a:rPr sz="900" b="0">
-                <a:solidFill>
-                  <a:srgbClr val="666666"/>
-                </a:solidFill>
-                <a:latin typeface="Manrope"/>
-              </a:rPr>
-              <a:t>Future Roadmap: Native mobile apps  •  SMS/WhatsApp notifications  •  Offline sync  •  Government portal integration (e-Panchayat, LGD)  •  Voice-first navigation  •  Predictive analytics</a:t>
-            </a:r>
           </a:p>
         </p:txBody>
       </p:sp>
@@ -13864,7 +15123,7 @@
         </p:nvSpPr>
         <p:spPr>
           <a:xfrm>
-            <a:off x="310896" y="2464308"/>
+            <a:off x="310896" y="2441448"/>
             <a:ext cx="8412480" cy="18288"/>
           </a:xfrm>
           <a:prstGeom prst="rect">
@@ -14459,7 +15718,7 @@
           <a:p>
             <a:pPr algn="ctr"/>
             <a:r>
-              <a:rPr sz="800" b="0" dirty="0">
+              <a:rPr sz="800" b="0">
                 <a:solidFill>
                   <a:srgbClr val="202729"/>
                 </a:solidFill>
@@ -14478,7 +15737,7 @@
         </p:nvSpPr>
         <p:spPr>
           <a:xfrm>
-            <a:off x="310896" y="3753612"/>
+            <a:off x="310896" y="3762756"/>
             <a:ext cx="8412480" cy="27432"/>
           </a:xfrm>
           <a:prstGeom prst="rect">
@@ -15879,8 +17138,8 @@
         </p:nvSpPr>
         <p:spPr>
           <a:xfrm>
-            <a:off x="310896" y="3072383"/>
-            <a:ext cx="1965960" cy="659753"/>
+            <a:off x="310896" y="3072384"/>
+            <a:ext cx="1965960" cy="585216"/>
           </a:xfrm>
           <a:prstGeom prst="roundRect">
             <a:avLst>
@@ -15928,7 +17187,7 @@
         <p:spPr>
           <a:xfrm>
             <a:off x="310896" y="3072384"/>
-            <a:ext cx="45720" cy="659752"/>
+            <a:ext cx="45720" cy="475488"/>
           </a:xfrm>
           <a:prstGeom prst="rect">
             <a:avLst/>
@@ -16018,7 +17277,7 @@
           <a:p>
             <a:pPr algn="l"/>
             <a:r>
-              <a:rPr sz="800" b="0">
+              <a:rPr sz="800" b="0" dirty="0">
                 <a:solidFill>
                   <a:srgbClr val="434343"/>
                 </a:solidFill>
@@ -16115,8 +17374,8 @@
         </p:nvSpPr>
         <p:spPr>
           <a:xfrm>
-            <a:off x="4837176" y="3072383"/>
-            <a:ext cx="4023360" cy="627749"/>
+            <a:off x="4837176" y="3072384"/>
+            <a:ext cx="4023360" cy="585216"/>
           </a:xfrm>
           <a:prstGeom prst="roundRect">
             <a:avLst>
@@ -16273,7 +17532,7 @@
         </p:nvSpPr>
         <p:spPr>
           <a:xfrm>
-            <a:off x="310896" y="3809861"/>
+            <a:off x="333756" y="3712464"/>
             <a:ext cx="8412480" cy="27432"/>
           </a:xfrm>
           <a:prstGeom prst="rect">
@@ -16317,7 +17576,7 @@
         </p:nvSpPr>
         <p:spPr>
           <a:xfrm>
-            <a:off x="310896" y="3915017"/>
+            <a:off x="310896" y="3730752"/>
             <a:ext cx="8412480" cy="457200"/>
           </a:xfrm>
           <a:prstGeom prst="rect">
@@ -16331,7 +17590,7 @@
           <a:p>
             <a:pPr algn="l"/>
             <a:r>
-              <a:rPr sz="900" b="0" dirty="0">
+              <a:rPr sz="900" b="0">
                 <a:solidFill>
                   <a:srgbClr val="666666"/>
                 </a:solidFill>

</xml_diff>